<commit_message>
Updated After Presentation Day (04/20/18)
</commit_message>
<xml_diff>
--- a/Bingo.pptx
+++ b/Bingo.pptx
@@ -23,10 +23,11 @@
     <p:sldId id="286" r:id="rId17"/>
     <p:sldId id="273" r:id="rId18"/>
     <p:sldId id="287" r:id="rId19"/>
-    <p:sldId id="288" r:id="rId20"/>
-    <p:sldId id="289" r:id="rId21"/>
-    <p:sldId id="274" r:id="rId22"/>
-    <p:sldId id="280" r:id="rId23"/>
+    <p:sldId id="290" r:id="rId20"/>
+    <p:sldId id="288" r:id="rId21"/>
+    <p:sldId id="289" r:id="rId22"/>
+    <p:sldId id="274" r:id="rId23"/>
+    <p:sldId id="280" r:id="rId24"/>
   </p:sldIdLst>
   <p:sldSz cx="12192000" cy="6858000"/>
   <p:notesSz cx="6858000" cy="9144000"/>
@@ -282,7 +283,7 @@
           <a:p>
             <a:fld id="{96EA69BF-25BF-4E66-A46C-6ED1AC869A84}" type="datetimeFigureOut">
               <a:rPr lang="en-IN" smtClean="0"/>
-              <a:t>05-05-2018</a:t>
+              <a:t>05-06-2018</a:t>
             </a:fld>
             <a:endParaRPr lang="en-IN"/>
           </a:p>
@@ -482,7 +483,7 @@
           <a:p>
             <a:fld id="{96EA69BF-25BF-4E66-A46C-6ED1AC869A84}" type="datetimeFigureOut">
               <a:rPr lang="en-IN" smtClean="0"/>
-              <a:t>05-05-2018</a:t>
+              <a:t>05-06-2018</a:t>
             </a:fld>
             <a:endParaRPr lang="en-IN"/>
           </a:p>
@@ -692,7 +693,7 @@
           <a:p>
             <a:fld id="{96EA69BF-25BF-4E66-A46C-6ED1AC869A84}" type="datetimeFigureOut">
               <a:rPr lang="en-IN" smtClean="0"/>
-              <a:t>05-05-2018</a:t>
+              <a:t>05-06-2018</a:t>
             </a:fld>
             <a:endParaRPr lang="en-IN"/>
           </a:p>
@@ -892,7 +893,7 @@
           <a:p>
             <a:fld id="{96EA69BF-25BF-4E66-A46C-6ED1AC869A84}" type="datetimeFigureOut">
               <a:rPr lang="en-IN" smtClean="0"/>
-              <a:t>05-05-2018</a:t>
+              <a:t>05-06-2018</a:t>
             </a:fld>
             <a:endParaRPr lang="en-IN"/>
           </a:p>
@@ -1168,7 +1169,7 @@
           <a:p>
             <a:fld id="{96EA69BF-25BF-4E66-A46C-6ED1AC869A84}" type="datetimeFigureOut">
               <a:rPr lang="en-IN" smtClean="0"/>
-              <a:t>05-05-2018</a:t>
+              <a:t>05-06-2018</a:t>
             </a:fld>
             <a:endParaRPr lang="en-IN"/>
           </a:p>
@@ -1436,7 +1437,7 @@
           <a:p>
             <a:fld id="{96EA69BF-25BF-4E66-A46C-6ED1AC869A84}" type="datetimeFigureOut">
               <a:rPr lang="en-IN" smtClean="0"/>
-              <a:t>05-05-2018</a:t>
+              <a:t>05-06-2018</a:t>
             </a:fld>
             <a:endParaRPr lang="en-IN"/>
           </a:p>
@@ -1851,7 +1852,7 @@
           <a:p>
             <a:fld id="{96EA69BF-25BF-4E66-A46C-6ED1AC869A84}" type="datetimeFigureOut">
               <a:rPr lang="en-IN" smtClean="0"/>
-              <a:t>05-05-2018</a:t>
+              <a:t>05-06-2018</a:t>
             </a:fld>
             <a:endParaRPr lang="en-IN"/>
           </a:p>
@@ -1993,7 +1994,7 @@
           <a:p>
             <a:fld id="{96EA69BF-25BF-4E66-A46C-6ED1AC869A84}" type="datetimeFigureOut">
               <a:rPr lang="en-IN" smtClean="0"/>
-              <a:t>05-05-2018</a:t>
+              <a:t>05-06-2018</a:t>
             </a:fld>
             <a:endParaRPr lang="en-IN"/>
           </a:p>
@@ -2106,7 +2107,7 @@
           <a:p>
             <a:fld id="{96EA69BF-25BF-4E66-A46C-6ED1AC869A84}" type="datetimeFigureOut">
               <a:rPr lang="en-IN" smtClean="0"/>
-              <a:t>05-05-2018</a:t>
+              <a:t>05-06-2018</a:t>
             </a:fld>
             <a:endParaRPr lang="en-IN"/>
           </a:p>
@@ -2419,7 +2420,7 @@
           <a:p>
             <a:fld id="{96EA69BF-25BF-4E66-A46C-6ED1AC869A84}" type="datetimeFigureOut">
               <a:rPr lang="en-IN" smtClean="0"/>
-              <a:t>05-05-2018</a:t>
+              <a:t>05-06-2018</a:t>
             </a:fld>
             <a:endParaRPr lang="en-IN"/>
           </a:p>
@@ -2708,7 +2709,7 @@
           <a:p>
             <a:fld id="{96EA69BF-25BF-4E66-A46C-6ED1AC869A84}" type="datetimeFigureOut">
               <a:rPr lang="en-IN" smtClean="0"/>
-              <a:t>05-05-2018</a:t>
+              <a:t>05-06-2018</a:t>
             </a:fld>
             <a:endParaRPr lang="en-IN"/>
           </a:p>
@@ -2951,7 +2952,7 @@
           <a:p>
             <a:fld id="{96EA69BF-25BF-4E66-A46C-6ED1AC869A84}" type="datetimeFigureOut">
               <a:rPr lang="en-IN" smtClean="0"/>
-              <a:t>05-05-2018</a:t>
+              <a:t>05-06-2018</a:t>
             </a:fld>
             <a:endParaRPr lang="en-IN"/>
           </a:p>
@@ -12132,7 +12133,7 @@
         </p:blipFill>
         <p:spPr>
           <a:xfrm>
-            <a:off x="-1" y="-69065"/>
+            <a:off x="0" y="0"/>
             <a:ext cx="12192000" cy="6857990"/>
           </a:xfrm>
           <a:prstGeom prst="rect">
@@ -12500,7 +12501,7 @@
         </p:nvSpPr>
         <p:spPr>
           <a:xfrm>
-            <a:off x="120270" y="39762"/>
+            <a:off x="612252" y="581159"/>
             <a:ext cx="6593618" cy="1406667"/>
           </a:xfrm>
         </p:spPr>
@@ -12538,7 +12539,7 @@
         </p:nvSpPr>
         <p:spPr>
           <a:xfrm>
-            <a:off x="303155" y="1082962"/>
+            <a:off x="372729" y="1555255"/>
             <a:ext cx="5478085" cy="432571"/>
           </a:xfrm>
         </p:spPr>
@@ -12553,17 +12554,17 @@
             </a:pPr>
             <a:r>
               <a:rPr lang="en-IN" sz="2400" b="1" dirty="0"/>
-              <a:t>Plot for 1000 games</a:t>
+              <a:t>Statistical Summary for 10,000 games</a:t>
             </a:r>
           </a:p>
         </p:txBody>
       </p:sp>
       <p:pic>
         <p:nvPicPr>
-          <p:cNvPr id="6" name="Picture 5" descr="A close up of text on a white background&#10;&#10;Description generated with high confidence">
-            <a:extLst>
-              <a:ext uri="{FF2B5EF4-FFF2-40B4-BE49-F238E27FC236}">
-                <a16:creationId xmlns:a16="http://schemas.microsoft.com/office/drawing/2014/main" id="{B3CF0FA1-B0A3-4DE9-B6A9-8E8FAF9D6A44}"/>
+          <p:cNvPr id="6" name="Picture 5" descr="A screenshot of a computer&#10;&#10;Description generated with very high confidence">
+            <a:extLst>
+              <a:ext uri="{FF2B5EF4-FFF2-40B4-BE49-F238E27FC236}">
+                <a16:creationId xmlns:a16="http://schemas.microsoft.com/office/drawing/2014/main" id="{A6159445-7BCF-46DB-A2D5-D4F1E254AD39}"/>
               </a:ext>
             </a:extLst>
           </p:cNvPr>
@@ -12586,8 +12587,8 @@
         </p:blipFill>
         <p:spPr>
           <a:xfrm>
-            <a:off x="534219" y="1598789"/>
-            <a:ext cx="5896398" cy="4968671"/>
+            <a:off x="71551" y="1987826"/>
+            <a:ext cx="6642337" cy="4816665"/>
           </a:xfrm>
           <a:prstGeom prst="rect">
             <a:avLst/>
@@ -12597,7 +12598,7 @@
     </p:spTree>
     <p:extLst>
       <p:ext uri="{BB962C8B-B14F-4D97-AF65-F5344CB8AC3E}">
-        <p14:creationId xmlns:p14="http://schemas.microsoft.com/office/powerpoint/2010/main" val="4261328932"/>
+        <p14:creationId xmlns:p14="http://schemas.microsoft.com/office/powerpoint/2010/main" val="3413279288"/>
       </p:ext>
     </p:extLst>
   </p:cSld>
@@ -13172,7 +13173,7 @@
         </p:blipFill>
         <p:spPr>
           <a:xfrm>
-            <a:off x="0" y="10"/>
+            <a:off x="-1" y="-69065"/>
             <a:ext cx="12192000" cy="6857990"/>
           </a:xfrm>
           <a:prstGeom prst="rect">
@@ -13540,7 +13541,7 @@
         </p:nvSpPr>
         <p:spPr>
           <a:xfrm>
-            <a:off x="249477" y="477080"/>
+            <a:off x="120270" y="39762"/>
             <a:ext cx="6593618" cy="1406667"/>
           </a:xfrm>
         </p:spPr>
@@ -13555,7 +13556,7 @@
                 <a:latin typeface="AR JULIAN" panose="02000000000000000000" pitchFamily="2" charset="0"/>
                 <a:cs typeface="Aharoni" panose="02010803020104030203" pitchFamily="2" charset="-79"/>
               </a:rPr>
-              <a:t>Limitations</a:t>
+              <a:t>Result</a:t>
             </a:r>
           </a:p>
         </p:txBody>
@@ -13578,8 +13579,8 @@
         </p:nvSpPr>
         <p:spPr>
           <a:xfrm>
-            <a:off x="303155" y="1897974"/>
-            <a:ext cx="6266610" cy="4045626"/>
+            <a:off x="303155" y="1082962"/>
+            <a:ext cx="5478085" cy="432571"/>
           </a:xfrm>
         </p:spPr>
         <p:txBody>
@@ -13588,64 +13589,56 @@
           </a:bodyPr>
           <a:lstStyle/>
           <a:p>
-            <a:pPr marL="457200" indent="-457200">
-              <a:buFont typeface="+mj-lt"/>
-              <a:buAutoNum type="arabicPeriod"/>
+            <a:pPr marL="0" indent="0">
+              <a:buNone/>
             </a:pPr>
             <a:r>
-              <a:rPr lang="en-IN" sz="2400" dirty="0"/>
-              <a:t>Each participant buys only one ticket for a game.</a:t>
+              <a:rPr lang="en-IN" sz="2400" b="1" dirty="0"/>
+              <a:t>Plot for 1000 games</a:t>
             </a:r>
-          </a:p>
-          <a:p>
-            <a:pPr marL="457200" indent="-457200">
-              <a:buFont typeface="+mj-lt"/>
-              <a:buAutoNum type="arabicPeriod"/>
-            </a:pPr>
-            <a:r>
-              <a:rPr lang="en-IN" sz="2400" dirty="0"/>
-              <a:t>Minimum number of players in one game is 10.</a:t>
-            </a:r>
-          </a:p>
-          <a:p>
-            <a:pPr marL="457200" indent="-457200">
-              <a:buFont typeface="+mj-lt"/>
-              <a:buAutoNum type="arabicPeriod"/>
-            </a:pPr>
-            <a:r>
-              <a:rPr lang="en-IN" sz="2400" dirty="0"/>
-              <a:t>Maximum number of players in one game is 100.</a:t>
-            </a:r>
-          </a:p>
-          <a:p>
-            <a:pPr marL="457200" indent="-457200">
-              <a:buFont typeface="+mj-lt"/>
-              <a:buAutoNum type="arabicPeriod"/>
-            </a:pPr>
-            <a:r>
-              <a:rPr lang="en-IN" sz="2400" dirty="0"/>
-              <a:t>No coinciding winning occurs.</a:t>
-            </a:r>
-          </a:p>
-          <a:p>
-            <a:pPr marL="457200" indent="-457200">
-              <a:buFont typeface="+mj-lt"/>
-              <a:buAutoNum type="arabicPeriod"/>
-            </a:pPr>
-            <a:r>
-              <a:rPr lang="en-IN" sz="2400" dirty="0"/>
-              <a:t>This simulation is applicable to British Bingo only.</a:t>
-            </a:r>
-          </a:p>
-          <a:p>
-            <a:endParaRPr lang="en-IN" sz="2400" b="1" dirty="0"/>
           </a:p>
         </p:txBody>
       </p:sp>
+      <p:pic>
+        <p:nvPicPr>
+          <p:cNvPr id="6" name="Picture 5" descr="A close up of text on a white background&#10;&#10;Description generated with high confidence">
+            <a:extLst>
+              <a:ext uri="{FF2B5EF4-FFF2-40B4-BE49-F238E27FC236}">
+                <a16:creationId xmlns:a16="http://schemas.microsoft.com/office/drawing/2014/main" id="{B3CF0FA1-B0A3-4DE9-B6A9-8E8FAF9D6A44}"/>
+              </a:ext>
+            </a:extLst>
+          </p:cNvPr>
+          <p:cNvPicPr>
+            <a:picLocks noChangeAspect="1"/>
+          </p:cNvPicPr>
+          <p:nvPr/>
+        </p:nvPicPr>
+        <p:blipFill>
+          <a:blip r:embed="rId4">
+            <a:extLst>
+              <a:ext uri="{28A0092B-C50C-407E-A947-70E740481C1C}">
+                <a14:useLocalDpi xmlns:a14="http://schemas.microsoft.com/office/drawing/2010/main" val="0"/>
+              </a:ext>
+            </a:extLst>
+          </a:blip>
+          <a:stretch>
+            <a:fillRect/>
+          </a:stretch>
+        </p:blipFill>
+        <p:spPr>
+          <a:xfrm>
+            <a:off x="534219" y="1598789"/>
+            <a:ext cx="5896398" cy="4968671"/>
+          </a:xfrm>
+          <a:prstGeom prst="rect">
+            <a:avLst/>
+          </a:prstGeom>
+        </p:spPr>
+      </p:pic>
     </p:spTree>
     <p:extLst>
       <p:ext uri="{BB962C8B-B14F-4D97-AF65-F5344CB8AC3E}">
-        <p14:creationId xmlns:p14="http://schemas.microsoft.com/office/powerpoint/2010/main" val="1796752725"/>
+        <p14:creationId xmlns:p14="http://schemas.microsoft.com/office/powerpoint/2010/main" val="4261328932"/>
       </p:ext>
     </p:extLst>
   </p:cSld>
@@ -13715,7 +13708,7 @@
         </p:blipFill>
         <p:spPr>
           <a:xfrm>
-            <a:off x="-1" y="0"/>
+            <a:off x="0" y="10"/>
             <a:ext cx="12192000" cy="6857990"/>
           </a:xfrm>
           <a:prstGeom prst="rect">
@@ -14083,6 +14076,549 @@
         </p:nvSpPr>
         <p:spPr>
           <a:xfrm>
+            <a:off x="249477" y="477080"/>
+            <a:ext cx="6593618" cy="1406667"/>
+          </a:xfrm>
+        </p:spPr>
+        <p:txBody>
+          <a:bodyPr>
+            <a:normAutofit/>
+          </a:bodyPr>
+          <a:lstStyle/>
+          <a:p>
+            <a:r>
+              <a:rPr lang="en-IN" b="1" dirty="0">
+                <a:latin typeface="AR JULIAN" panose="02000000000000000000" pitchFamily="2" charset="0"/>
+                <a:cs typeface="Aharoni" panose="02010803020104030203" pitchFamily="2" charset="-79"/>
+              </a:rPr>
+              <a:t>Limitations</a:t>
+            </a:r>
+          </a:p>
+        </p:txBody>
+      </p:sp>
+      <p:sp>
+        <p:nvSpPr>
+          <p:cNvPr id="3" name="Content Placeholder 2">
+            <a:extLst>
+              <a:ext uri="{FF2B5EF4-FFF2-40B4-BE49-F238E27FC236}">
+                <a16:creationId xmlns:a16="http://schemas.microsoft.com/office/drawing/2014/main" id="{D7859ED5-771F-4FFC-AC08-C6A010E59617}"/>
+              </a:ext>
+            </a:extLst>
+          </p:cNvPr>
+          <p:cNvSpPr>
+            <a:spLocks noGrp="1"/>
+          </p:cNvSpPr>
+          <p:nvPr>
+            <p:ph idx="1"/>
+          </p:nvPr>
+        </p:nvSpPr>
+        <p:spPr>
+          <a:xfrm>
+            <a:off x="303155" y="1897974"/>
+            <a:ext cx="6266610" cy="4045626"/>
+          </a:xfrm>
+        </p:spPr>
+        <p:txBody>
+          <a:bodyPr anchor="t">
+            <a:normAutofit/>
+          </a:bodyPr>
+          <a:lstStyle/>
+          <a:p>
+            <a:pPr marL="457200" indent="-457200">
+              <a:buFont typeface="+mj-lt"/>
+              <a:buAutoNum type="arabicPeriod"/>
+            </a:pPr>
+            <a:r>
+              <a:rPr lang="en-IN" sz="2400" dirty="0"/>
+              <a:t>Each participant buys only one ticket for a game.</a:t>
+            </a:r>
+          </a:p>
+          <a:p>
+            <a:pPr marL="457200" indent="-457200">
+              <a:buFont typeface="+mj-lt"/>
+              <a:buAutoNum type="arabicPeriod"/>
+            </a:pPr>
+            <a:r>
+              <a:rPr lang="en-IN" sz="2400" dirty="0"/>
+              <a:t>Minimum number of players in one game is 10.</a:t>
+            </a:r>
+          </a:p>
+          <a:p>
+            <a:pPr marL="457200" indent="-457200">
+              <a:buFont typeface="+mj-lt"/>
+              <a:buAutoNum type="arabicPeriod"/>
+            </a:pPr>
+            <a:r>
+              <a:rPr lang="en-IN" sz="2400" dirty="0"/>
+              <a:t>Maximum number of players in one game is 100.</a:t>
+            </a:r>
+          </a:p>
+          <a:p>
+            <a:pPr marL="457200" indent="-457200">
+              <a:buFont typeface="+mj-lt"/>
+              <a:buAutoNum type="arabicPeriod"/>
+            </a:pPr>
+            <a:r>
+              <a:rPr lang="en-IN" sz="2400" dirty="0"/>
+              <a:t>No coinciding winning occurs.</a:t>
+            </a:r>
+          </a:p>
+          <a:p>
+            <a:pPr marL="457200" indent="-457200">
+              <a:buFont typeface="+mj-lt"/>
+              <a:buAutoNum type="arabicPeriod"/>
+            </a:pPr>
+            <a:r>
+              <a:rPr lang="en-IN" sz="2400" dirty="0"/>
+              <a:t>This simulation is applicable to British Bingo only.</a:t>
+            </a:r>
+          </a:p>
+          <a:p>
+            <a:endParaRPr lang="en-IN" sz="2400" b="1" dirty="0"/>
+          </a:p>
+        </p:txBody>
+      </p:sp>
+    </p:spTree>
+    <p:extLst>
+      <p:ext uri="{BB962C8B-B14F-4D97-AF65-F5344CB8AC3E}">
+        <p14:creationId xmlns:p14="http://schemas.microsoft.com/office/powerpoint/2010/main" val="1796752725"/>
+      </p:ext>
+    </p:extLst>
+  </p:cSld>
+  <p:clrMapOvr>
+    <a:overrideClrMapping bg1="dk1" tx1="lt1" bg2="dk2" tx2="lt2" accent1="accent1" accent2="accent2" accent3="accent3" accent4="accent4" accent5="accent5" accent6="accent6" hlink="hlink" folHlink="folHlink"/>
+  </p:clrMapOvr>
+</p:sld>
+</file>
+
+<file path=ppt/slides/slide22.xml><?xml version="1.0" encoding="utf-8"?>
+<p:sld xmlns:a="http://schemas.openxmlformats.org/drawingml/2006/main" xmlns:r="http://schemas.openxmlformats.org/officeDocument/2006/relationships" xmlns:p="http://schemas.openxmlformats.org/presentationml/2006/main">
+  <p:cSld>
+    <p:bg>
+      <p:bgPr>
+        <a:solidFill>
+          <a:schemeClr val="bg1"/>
+        </a:solidFill>
+        <a:effectLst/>
+      </p:bgPr>
+    </p:bg>
+    <p:spTree>
+      <p:nvGrpSpPr>
+        <p:cNvPr id="1" name=""/>
+        <p:cNvGrpSpPr/>
+        <p:nvPr/>
+      </p:nvGrpSpPr>
+      <p:grpSpPr>
+        <a:xfrm>
+          <a:off x="0" y="0"/>
+          <a:ext cx="0" cy="0"/>
+          <a:chOff x="0" y="0"/>
+          <a:chExt cx="0" cy="0"/>
+        </a:xfrm>
+      </p:grpSpPr>
+      <p:pic>
+        <p:nvPicPr>
+          <p:cNvPr id="7" name="Picture 6">
+            <a:extLst>
+              <a:ext uri="{FF2B5EF4-FFF2-40B4-BE49-F238E27FC236}">
+                <a16:creationId xmlns:a16="http://schemas.microsoft.com/office/drawing/2014/main" id="{8BA2A080-19F8-4969-A685-C648FF8CD3CE}"/>
+              </a:ext>
+            </a:extLst>
+          </p:cNvPr>
+          <p:cNvPicPr>
+            <a:picLocks noChangeAspect="1"/>
+          </p:cNvPicPr>
+          <p:nvPr/>
+        </p:nvPicPr>
+        <p:blipFill rotWithShape="1">
+          <a:blip r:embed="rId2">
+            <a:duotone>
+              <a:prstClr val="black"/>
+              <a:schemeClr val="tx2">
+                <a:tint val="45000"/>
+                <a:satMod val="400000"/>
+              </a:schemeClr>
+            </a:duotone>
+            <a:alphaModFix amt="35000"/>
+            <a:extLst>
+              <a:ext uri="{28A0092B-C50C-407E-A947-70E740481C1C}">
+                <a14:useLocalDpi xmlns:a14="http://schemas.microsoft.com/office/drawing/2010/main" val="0"/>
+              </a:ext>
+            </a:extLst>
+          </a:blip>
+          <a:srcRect t="13681" b="2075"/>
+          <a:stretch/>
+        </p:blipFill>
+        <p:spPr>
+          <a:xfrm>
+            <a:off x="-1" y="0"/>
+            <a:ext cx="12192000" cy="6857990"/>
+          </a:xfrm>
+          <a:prstGeom prst="rect">
+            <a:avLst/>
+          </a:prstGeom>
+        </p:spPr>
+      </p:pic>
+      <p:sp>
+        <p:nvSpPr>
+          <p:cNvPr id="51" name="Freeform 49">
+            <a:extLst>
+              <a:ext uri="{FF2B5EF4-FFF2-40B4-BE49-F238E27FC236}">
+                <a16:creationId xmlns:a16="http://schemas.microsoft.com/office/drawing/2014/main" id="{EF9B8DF2-C3F5-49A2-94D2-F7B65A0F1F15}"/>
+              </a:ext>
+            </a:extLst>
+          </p:cNvPr>
+          <p:cNvSpPr>
+            <a:spLocks noGrp="1" noRot="1" noChangeAspect="1" noMove="1" noResize="1" noEditPoints="1" noAdjustHandles="1" noChangeArrowheads="1" noChangeShapeType="1" noTextEdit="1"/>
+          </p:cNvSpPr>
+          <p:nvPr>
+            <p:extLst>
+              <p:ext uri="{386F3935-93C4-4BCD-93E2-E3B085C9AB24}">
+                <p16:designElem xmlns:p16="http://schemas.microsoft.com/office/powerpoint/2015/main" val="1"/>
+              </p:ext>
+            </p:extLst>
+          </p:nvPr>
+        </p:nvSpPr>
+        <p:spPr>
+          <a:xfrm flipH="1">
+            <a:off x="6713914" y="581159"/>
+            <a:ext cx="5478085" cy="6276841"/>
+          </a:xfrm>
+          <a:custGeom>
+            <a:avLst/>
+            <a:gdLst>
+              <a:gd name="connsiteX0" fmla="*/ 2178155 w 5478085"/>
+              <a:gd name="connsiteY0" fmla="*/ 0 h 6276841"/>
+              <a:gd name="connsiteX1" fmla="*/ 5478085 w 5478085"/>
+              <a:gd name="connsiteY1" fmla="*/ 3299930 h 6276841"/>
+              <a:gd name="connsiteX2" fmla="*/ 3751098 w 5478085"/>
+              <a:gd name="connsiteY2" fmla="*/ 6201577 h 6276841"/>
+              <a:gd name="connsiteX3" fmla="*/ 3594858 w 5478085"/>
+              <a:gd name="connsiteY3" fmla="*/ 6276841 h 6276841"/>
+              <a:gd name="connsiteX4" fmla="*/ 761453 w 5478085"/>
+              <a:gd name="connsiteY4" fmla="*/ 6276841 h 6276841"/>
+              <a:gd name="connsiteX5" fmla="*/ 605213 w 5478085"/>
+              <a:gd name="connsiteY5" fmla="*/ 6201577 h 6276841"/>
+              <a:gd name="connsiteX6" fmla="*/ 79093 w 5478085"/>
+              <a:gd name="connsiteY6" fmla="*/ 5846317 h 6276841"/>
+              <a:gd name="connsiteX7" fmla="*/ 0 w 5478085"/>
+              <a:gd name="connsiteY7" fmla="*/ 5774432 h 6276841"/>
+              <a:gd name="connsiteX8" fmla="*/ 0 w 5478085"/>
+              <a:gd name="connsiteY8" fmla="*/ 825429 h 6276841"/>
+              <a:gd name="connsiteX9" fmla="*/ 79093 w 5478085"/>
+              <a:gd name="connsiteY9" fmla="*/ 753544 h 6276841"/>
+              <a:gd name="connsiteX10" fmla="*/ 2178155 w 5478085"/>
+              <a:gd name="connsiteY10" fmla="*/ 0 h 6276841"/>
+            </a:gdLst>
+            <a:ahLst/>
+            <a:cxnLst>
+              <a:cxn ang="0">
+                <a:pos x="connsiteX0" y="connsiteY0"/>
+              </a:cxn>
+              <a:cxn ang="0">
+                <a:pos x="connsiteX1" y="connsiteY1"/>
+              </a:cxn>
+              <a:cxn ang="0">
+                <a:pos x="connsiteX2" y="connsiteY2"/>
+              </a:cxn>
+              <a:cxn ang="0">
+                <a:pos x="connsiteX3" y="connsiteY3"/>
+              </a:cxn>
+              <a:cxn ang="0">
+                <a:pos x="connsiteX4" y="connsiteY4"/>
+              </a:cxn>
+              <a:cxn ang="0">
+                <a:pos x="connsiteX5" y="connsiteY5"/>
+              </a:cxn>
+              <a:cxn ang="0">
+                <a:pos x="connsiteX6" y="connsiteY6"/>
+              </a:cxn>
+              <a:cxn ang="0">
+                <a:pos x="connsiteX7" y="connsiteY7"/>
+              </a:cxn>
+              <a:cxn ang="0">
+                <a:pos x="connsiteX8" y="connsiteY8"/>
+              </a:cxn>
+              <a:cxn ang="0">
+                <a:pos x="connsiteX9" y="connsiteY9"/>
+              </a:cxn>
+              <a:cxn ang="0">
+                <a:pos x="connsiteX10" y="connsiteY10"/>
+              </a:cxn>
+            </a:cxnLst>
+            <a:rect l="l" t="t" r="r" b="b"/>
+            <a:pathLst>
+              <a:path w="5478085" h="6276841">
+                <a:moveTo>
+                  <a:pt x="2178155" y="0"/>
+                </a:moveTo>
+                <a:cubicBezTo>
+                  <a:pt x="4000656" y="0"/>
+                  <a:pt x="5478085" y="1477429"/>
+                  <a:pt x="5478085" y="3299930"/>
+                </a:cubicBezTo>
+                <a:cubicBezTo>
+                  <a:pt x="5478085" y="4552900"/>
+                  <a:pt x="4779769" y="5642769"/>
+                  <a:pt x="3751098" y="6201577"/>
+                </a:cubicBezTo>
+                <a:lnTo>
+                  <a:pt x="3594858" y="6276841"/>
+                </a:lnTo>
+                <a:lnTo>
+                  <a:pt x="761453" y="6276841"/>
+                </a:lnTo>
+                <a:lnTo>
+                  <a:pt x="605213" y="6201577"/>
+                </a:lnTo>
+                <a:cubicBezTo>
+                  <a:pt x="418182" y="6099975"/>
+                  <a:pt x="242071" y="5980818"/>
+                  <a:pt x="79093" y="5846317"/>
+                </a:cubicBezTo>
+                <a:lnTo>
+                  <a:pt x="0" y="5774432"/>
+                </a:lnTo>
+                <a:lnTo>
+                  <a:pt x="0" y="825429"/>
+                </a:lnTo>
+                <a:lnTo>
+                  <a:pt x="79093" y="753544"/>
+                </a:lnTo>
+                <a:cubicBezTo>
+                  <a:pt x="649516" y="282789"/>
+                  <a:pt x="1380811" y="0"/>
+                  <a:pt x="2178155" y="0"/>
+                </a:cubicBezTo>
+                <a:close/>
+              </a:path>
+            </a:pathLst>
+          </a:custGeom>
+          <a:solidFill>
+            <a:srgbClr val="FFFFFF">
+              <a:alpha val="80000"/>
+            </a:srgbClr>
+          </a:solidFill>
+          <a:ln w="31750">
+            <a:noFill/>
+          </a:ln>
+        </p:spPr>
+        <p:style>
+          <a:lnRef idx="2">
+            <a:schemeClr val="accent1">
+              <a:shade val="50000"/>
+            </a:schemeClr>
+          </a:lnRef>
+          <a:fillRef idx="1">
+            <a:schemeClr val="accent1"/>
+          </a:fillRef>
+          <a:effectRef idx="0">
+            <a:schemeClr val="accent1"/>
+          </a:effectRef>
+          <a:fontRef idx="minor">
+            <a:schemeClr val="lt1"/>
+          </a:fontRef>
+        </p:style>
+        <p:txBody>
+          <a:bodyPr wrap="square" rtlCol="0" anchor="ctr">
+            <a:noAutofit/>
+          </a:bodyPr>
+          <a:lstStyle/>
+          <a:p>
+            <a:pPr marL="0" marR="0" lvl="0" indent="0" algn="ctr" defTabSz="914400" rtl="0" eaLnBrk="1" fontAlgn="auto" latinLnBrk="0" hangingPunct="1">
+              <a:lnSpc>
+                <a:spcPct val="100000"/>
+              </a:lnSpc>
+              <a:spcBef>
+                <a:spcPts val="0"/>
+              </a:spcBef>
+              <a:spcAft>
+                <a:spcPts val="0"/>
+              </a:spcAft>
+              <a:buClrTx/>
+              <a:buSzTx/>
+              <a:buFontTx/>
+              <a:buNone/>
+              <a:tabLst/>
+              <a:defRPr/>
+            </a:pPr>
+            <a:endParaRPr kumimoji="0" lang="en-US" sz="1800" b="0" i="0" u="none" strike="noStrike" kern="1200" cap="none" spc="0" normalizeH="0" baseline="0" noProof="0">
+              <a:ln>
+                <a:noFill/>
+              </a:ln>
+              <a:solidFill>
+                <a:prstClr val="white"/>
+              </a:solidFill>
+              <a:effectLst/>
+              <a:uLnTx/>
+              <a:uFillTx/>
+              <a:latin typeface="Calibri" panose="020F0502020204030204"/>
+              <a:ea typeface="+mn-ea"/>
+              <a:cs typeface="+mn-cs"/>
+            </a:endParaRPr>
+          </a:p>
+        </p:txBody>
+      </p:sp>
+      <p:pic>
+        <p:nvPicPr>
+          <p:cNvPr id="9" name="Picture 8" descr="A picture containing building&#10;&#10;Description generated with high confidence">
+            <a:extLst>
+              <a:ext uri="{FF2B5EF4-FFF2-40B4-BE49-F238E27FC236}">
+                <a16:creationId xmlns:a16="http://schemas.microsoft.com/office/drawing/2014/main" id="{12ED8CBA-3DDA-400E-B2EE-7748A997FAC8}"/>
+              </a:ext>
+            </a:extLst>
+          </p:cNvPr>
+          <p:cNvPicPr>
+            <a:picLocks noChangeAspect="1"/>
+          </p:cNvPicPr>
+          <p:nvPr/>
+        </p:nvPicPr>
+        <p:blipFill rotWithShape="1">
+          <a:blip r:embed="rId3">
+            <a:extLst>
+              <a:ext uri="{28A0092B-C50C-407E-A947-70E740481C1C}">
+                <a14:useLocalDpi xmlns:a14="http://schemas.microsoft.com/office/drawing/2010/main" val="0"/>
+              </a:ext>
+            </a:extLst>
+          </a:blip>
+          <a:srcRect l="18375" r="23620" b="1"/>
+          <a:stretch/>
+        </p:blipFill>
+        <p:spPr>
+          <a:xfrm>
+            <a:off x="6893342" y="760562"/>
+            <a:ext cx="5298683" cy="6097438"/>
+          </a:xfrm>
+          <a:custGeom>
+            <a:avLst/>
+            <a:gdLst>
+              <a:gd name="connsiteX0" fmla="*/ 3120528 w 5298683"/>
+              <a:gd name="connsiteY0" fmla="*/ 0 h 6097438"/>
+              <a:gd name="connsiteX1" fmla="*/ 5105473 w 5298683"/>
+              <a:gd name="connsiteY1" fmla="*/ 712577 h 6097438"/>
+              <a:gd name="connsiteX2" fmla="*/ 5298683 w 5298683"/>
+              <a:gd name="connsiteY2" fmla="*/ 888178 h 6097438"/>
+              <a:gd name="connsiteX3" fmla="*/ 5298683 w 5298683"/>
+              <a:gd name="connsiteY3" fmla="*/ 5352876 h 6097438"/>
+              <a:gd name="connsiteX4" fmla="*/ 5105473 w 5298683"/>
+              <a:gd name="connsiteY4" fmla="*/ 5528477 h 6097438"/>
+              <a:gd name="connsiteX5" fmla="*/ 4335177 w 5298683"/>
+              <a:gd name="connsiteY5" fmla="*/ 5995828 h 6097438"/>
+              <a:gd name="connsiteX6" fmla="*/ 4057556 w 5298683"/>
+              <a:gd name="connsiteY6" fmla="*/ 6097438 h 6097438"/>
+              <a:gd name="connsiteX7" fmla="*/ 2183499 w 5298683"/>
+              <a:gd name="connsiteY7" fmla="*/ 6097438 h 6097438"/>
+              <a:gd name="connsiteX8" fmla="*/ 1905878 w 5298683"/>
+              <a:gd name="connsiteY8" fmla="*/ 5995828 h 6097438"/>
+              <a:gd name="connsiteX9" fmla="*/ 0 w 5298683"/>
+              <a:gd name="connsiteY9" fmla="*/ 3120527 h 6097438"/>
+              <a:gd name="connsiteX10" fmla="*/ 3120528 w 5298683"/>
+              <a:gd name="connsiteY10" fmla="*/ 0 h 6097438"/>
+            </a:gdLst>
+            <a:ahLst/>
+            <a:cxnLst>
+              <a:cxn ang="0">
+                <a:pos x="connsiteX0" y="connsiteY0"/>
+              </a:cxn>
+              <a:cxn ang="0">
+                <a:pos x="connsiteX1" y="connsiteY1"/>
+              </a:cxn>
+              <a:cxn ang="0">
+                <a:pos x="connsiteX2" y="connsiteY2"/>
+              </a:cxn>
+              <a:cxn ang="0">
+                <a:pos x="connsiteX3" y="connsiteY3"/>
+              </a:cxn>
+              <a:cxn ang="0">
+                <a:pos x="connsiteX4" y="connsiteY4"/>
+              </a:cxn>
+              <a:cxn ang="0">
+                <a:pos x="connsiteX5" y="connsiteY5"/>
+              </a:cxn>
+              <a:cxn ang="0">
+                <a:pos x="connsiteX6" y="connsiteY6"/>
+              </a:cxn>
+              <a:cxn ang="0">
+                <a:pos x="connsiteX7" y="connsiteY7"/>
+              </a:cxn>
+              <a:cxn ang="0">
+                <a:pos x="connsiteX8" y="connsiteY8"/>
+              </a:cxn>
+              <a:cxn ang="0">
+                <a:pos x="connsiteX9" y="connsiteY9"/>
+              </a:cxn>
+              <a:cxn ang="0">
+                <a:pos x="connsiteX10" y="connsiteY10"/>
+              </a:cxn>
+            </a:cxnLst>
+            <a:rect l="l" t="t" r="r" b="b"/>
+            <a:pathLst>
+              <a:path w="5298683" h="6097438">
+                <a:moveTo>
+                  <a:pt x="3120528" y="0"/>
+                </a:moveTo>
+                <a:cubicBezTo>
+                  <a:pt x="3874524" y="0"/>
+                  <a:pt x="4566062" y="267415"/>
+                  <a:pt x="5105473" y="712577"/>
+                </a:cubicBezTo>
+                <a:lnTo>
+                  <a:pt x="5298683" y="888178"/>
+                </a:lnTo>
+                <a:lnTo>
+                  <a:pt x="5298683" y="5352876"/>
+                </a:lnTo>
+                <a:lnTo>
+                  <a:pt x="5105473" y="5528477"/>
+                </a:lnTo>
+                <a:cubicBezTo>
+                  <a:pt x="4874296" y="5719261"/>
+                  <a:pt x="4615179" y="5877397"/>
+                  <a:pt x="4335177" y="5995828"/>
+                </a:cubicBezTo>
+                <a:lnTo>
+                  <a:pt x="4057556" y="6097438"/>
+                </a:lnTo>
+                <a:lnTo>
+                  <a:pt x="2183499" y="6097438"/>
+                </a:lnTo>
+                <a:lnTo>
+                  <a:pt x="1905878" y="5995828"/>
+                </a:lnTo>
+                <a:cubicBezTo>
+                  <a:pt x="785873" y="5522106"/>
+                  <a:pt x="0" y="4413092"/>
+                  <a:pt x="0" y="3120527"/>
+                </a:cubicBezTo>
+                <a:cubicBezTo>
+                  <a:pt x="0" y="1397108"/>
+                  <a:pt x="1397108" y="0"/>
+                  <a:pt x="3120528" y="0"/>
+                </a:cubicBezTo>
+                <a:close/>
+              </a:path>
+            </a:pathLst>
+          </a:custGeom>
+        </p:spPr>
+      </p:pic>
+      <p:sp>
+        <p:nvSpPr>
+          <p:cNvPr id="2" name="Title 1">
+            <a:extLst>
+              <a:ext uri="{FF2B5EF4-FFF2-40B4-BE49-F238E27FC236}">
+                <a16:creationId xmlns:a16="http://schemas.microsoft.com/office/drawing/2014/main" id="{7035F1BC-202E-45ED-A443-7B13BF42F19C}"/>
+              </a:ext>
+            </a:extLst>
+          </p:cNvPr>
+          <p:cNvSpPr>
+            <a:spLocks noGrp="1"/>
+          </p:cNvSpPr>
+          <p:nvPr>
+            <p:ph type="title"/>
+          </p:nvPr>
+        </p:nvSpPr>
+        <p:spPr>
+          <a:xfrm>
             <a:off x="0" y="1351686"/>
             <a:ext cx="7737651" cy="3955835"/>
           </a:xfrm>
@@ -14143,7 +14679,7 @@
 </p:sld>
 </file>
 
-<file path=ppt/slides/slide22.xml><?xml version="1.0" encoding="utf-8"?>
+<file path=ppt/slides/slide23.xml><?xml version="1.0" encoding="utf-8"?>
 <p:sld xmlns:a="http://schemas.openxmlformats.org/drawingml/2006/main" xmlns:r="http://schemas.openxmlformats.org/officeDocument/2006/relationships" xmlns:p="http://schemas.openxmlformats.org/presentationml/2006/main">
   <p:cSld>
     <p:bg>

</xml_diff>